<commit_message>
new and neatly formatted FINAL
</commit_message>
<xml_diff>
--- a/os assignment ppt.pptx
+++ b/os assignment ppt.pptx
@@ -12594,6 +12594,12 @@
               <a:rPr lang="en-US" sz="3600" dirty="0"/>
               <a:t>Why is a Directory Structure Needed?</a:t>
             </a:r>
+            <a:r>
+              <a:rPr lang="en-US" sz="3600" dirty="0">
+                <a:sym typeface="DM Sans Medium"/>
+              </a:rPr>
+              <a:t/>
+            </a:r>
             <a:br>
               <a:rPr lang="en-US" sz="3600" dirty="0">
                 <a:sym typeface="DM Sans Medium"/>
@@ -12901,7 +12907,23 @@
           <a:p>
             <a:r>
               <a:rPr lang="en-US" dirty="0"/>
-              <a:t>Types of directory structures​</a:t>
+              <a:t>Types of </a:t>
+            </a:r>
+            <a:r>
+              <a:rPr lang="en-US" dirty="0" smtClean="0"/>
+              <a:t>Directory </a:t>
+            </a:r>
+            <a:r>
+              <a:rPr lang="en-US" dirty="0"/>
+              <a:t>S</a:t>
+            </a:r>
+            <a:r>
+              <a:rPr lang="en-US" dirty="0" smtClean="0"/>
+              <a:t>tructures</a:t>
+            </a:r>
+            <a:r>
+              <a:rPr lang="en-US" dirty="0"/>
+              <a:t>​</a:t>
             </a:r>
           </a:p>
         </p:txBody>
@@ -13049,7 +13071,15 @@
           <a:p>
             <a:r>
               <a:rPr lang="en-US" dirty="0"/>
-              <a:t>Each use has their own directory</a:t>
+              <a:t>Each </a:t>
+            </a:r>
+            <a:r>
+              <a:rPr lang="en-US" dirty="0" smtClean="0"/>
+              <a:t>user </a:t>
+            </a:r>
+            <a:r>
+              <a:rPr lang="en-US" dirty="0"/>
+              <a:t>has their own directory</a:t>
             </a:r>
           </a:p>
           <a:p>
@@ -13264,13 +13294,18 @@
           <a:lstStyle/>
           <a:p>
             <a:r>
-              <a:rPr lang="en-US" dirty="0">
+              <a:rPr lang="en-US" dirty="0" smtClean="0">
                 <a:solidFill>
                   <a:srgbClr val="F4EBE8"/>
                 </a:solidFill>
               </a:rPr>
-              <a:t>Types of directory structures​</a:t>
-            </a:r>
+              <a:t>Types of Directory Structures​</a:t>
+            </a:r>
+            <a:endParaRPr lang="en-US" dirty="0">
+              <a:solidFill>
+                <a:srgbClr val="F4EBE8"/>
+              </a:solidFill>
+            </a:endParaRPr>
           </a:p>
         </p:txBody>
       </p:sp>
@@ -13563,8 +13598,13 @@
           <a:p>
             <a:r>
               <a:rPr lang="en-US" dirty="0"/>
-              <a:t>Thank you</a:t>
-            </a:r>
+              <a:t>Thank </a:t>
+            </a:r>
+            <a:r>
+              <a:rPr lang="en-US" dirty="0" smtClean="0"/>
+              <a:t>You</a:t>
+            </a:r>
+            <a:endParaRPr lang="en-US" dirty="0"/>
           </a:p>
         </p:txBody>
       </p:sp>
@@ -14078,6 +14118,15 @@
 </file>
 
 <file path=customXml/item1.xml><?xml version="1.0" encoding="utf-8"?>
+<?mso-contentType ?>
+<FormTemplates xmlns="http://schemas.microsoft.com/sharepoint/v3/contenttype/forms">
+  <Display>DocumentLibraryForm</Display>
+  <Edit>DocumentLibraryForm</Edit>
+  <New>DocumentLibraryForm</New>
+</FormTemplates>
+</file>
+
+<file path=customXml/item2.xml><?xml version="1.0" encoding="utf-8"?>
 <ct:contentTypeSchema xmlns:ct="http://schemas.microsoft.com/office/2006/metadata/contentType" xmlns:ma="http://schemas.microsoft.com/office/2006/metadata/properties/metaAttributes" ct:_="" ma:_="" ma:contentTypeName="Document" ma:contentTypeID="0x01010079F111ED35F8CC479449609E8A0923A6" ma:contentTypeVersion="24" ma:contentTypeDescription="Create a new document." ma:contentTypeScope="" ma:versionID="2d714a3296df14eba7a100bb665443ca">
   <xsd:schema xmlns:xsd="http://www.w3.org/2001/XMLSchema" xmlns:xs="http://www.w3.org/2001/XMLSchema" xmlns:p="http://schemas.microsoft.com/office/2006/metadata/properties" xmlns:ns1="http://schemas.microsoft.com/sharepoint/v3" xmlns:ns2="71af3243-3dd4-4a8d-8c0d-dd76da1f02a5" xmlns:ns3="16c05727-aa75-4e4a-9b5f-8a80a1165891" xmlns:ns4="230e9df3-be65-4c73-a93b-d1236ebd677e" targetNamespace="http://schemas.microsoft.com/office/2006/metadata/properties" ma:root="true" ma:fieldsID="49549bf45bfbbfb6cffed527380e77e1" ns1:_="" ns2:_="" ns3:_="" ns4:_="">
     <xsd:import namespace="http://schemas.microsoft.com/sharepoint/v3"/>
@@ -14365,15 +14414,6 @@
 </ct:contentTypeSchema>
 </file>
 
-<file path=customXml/item2.xml><?xml version="1.0" encoding="utf-8"?>
-<?mso-contentType ?>
-<FormTemplates xmlns="http://schemas.microsoft.com/sharepoint/v3/contenttype/forms">
-  <Display>DocumentLibraryForm</Display>
-  <Edit>DocumentLibraryForm</Edit>
-  <New>DocumentLibraryForm</New>
-</FormTemplates>
-</file>
-
 <file path=customXml/item3.xml><?xml version="1.0" encoding="utf-8"?>
 <p:properties xmlns:p="http://schemas.microsoft.com/office/2006/metadata/properties" xmlns:xsi="http://www.w3.org/2001/XMLSchema-instance" xmlns:pc="http://schemas.microsoft.com/office/infopath/2007/PartnerControls">
   <documentManagement>
@@ -14395,6 +14435,14 @@
 </file>
 
 <file path=customXml/itemProps1.xml><?xml version="1.0" encoding="utf-8"?>
+<ds:datastoreItem xmlns:ds="http://schemas.openxmlformats.org/officeDocument/2006/customXml" ds:itemID="{5FA78568-A730-4D3B-A489-FD854E91254A}">
+  <ds:schemaRefs>
+    <ds:schemaRef ds:uri="http://schemas.microsoft.com/sharepoint/v3/contenttype/forms"/>
+  </ds:schemaRefs>
+</ds:datastoreItem>
+</file>
+
+<file path=customXml/itemProps2.xml><?xml version="1.0" encoding="utf-8"?>
 <ds:datastoreItem xmlns:ds="http://schemas.openxmlformats.org/officeDocument/2006/customXml" ds:itemID="{A7D90517-43A3-4BC6-B197-5C7B7D3DBCAD}">
   <ds:schemaRefs>
     <ds:schemaRef ds:uri="http://schemas.microsoft.com/office/2006/metadata/contentType"/>
@@ -14405,14 +14453,13 @@
     <ds:schemaRef ds:uri="71af3243-3dd4-4a8d-8c0d-dd76da1f02a5"/>
     <ds:schemaRef ds:uri="16c05727-aa75-4e4a-9b5f-8a80a1165891"/>
     <ds:schemaRef ds:uri="230e9df3-be65-4c73-a93b-d1236ebd677e"/>
-  </ds:schemaRefs>
-</ds:datastoreItem>
-</file>
-
-<file path=customXml/itemProps2.xml><?xml version="1.0" encoding="utf-8"?>
-<ds:datastoreItem xmlns:ds="http://schemas.openxmlformats.org/officeDocument/2006/customXml" ds:itemID="{5FA78568-A730-4D3B-A489-FD854E91254A}">
-  <ds:schemaRefs>
-    <ds:schemaRef ds:uri="http://schemas.microsoft.com/sharepoint/v3/contenttype/forms"/>
+    <ds:schemaRef ds:uri="http://schemas.microsoft.com/office/2006/metadata/properties"/>
+    <ds:schemaRef ds:uri="http://schemas.microsoft.com/office/2006/documentManagement/types"/>
+    <ds:schemaRef ds:uri="http://schemas.microsoft.com/office/infopath/2007/PartnerControls"/>
+    <ds:schemaRef ds:uri="http://schemas.openxmlformats.org/package/2006/metadata/core-properties"/>
+    <ds:schemaRef ds:uri="http://purl.org/dc/elements/1.1/"/>
+    <ds:schemaRef ds:uri="http://purl.org/dc/terms/"/>
+    <ds:schemaRef ds:uri="http://schemas.microsoft.com/internal/obd"/>
   </ds:schemaRefs>
 </ds:datastoreItem>
 </file>

</xml_diff>